<commit_message>
added examples for all trees
</commit_message>
<xml_diff>
--- a/doc/web_layout.pptx
+++ b/doc/web_layout.pptx
@@ -288,7 +288,8 @@
           <a:p>
             <a:fld id="{00B26848-F507-264C-9913-CB59C8F3ADAB}" type="datetimeFigureOut">
               <a:rPr lang="en-US" smtClean="0"/>
-              <a:t>7/31/12</a:t>
+              <a:pPr/>
+              <a:t>8/1/12</a:t>
             </a:fld>
             <a:endParaRPr lang="en-US"/>
           </a:p>
@@ -330,6 +331,7 @@
           <a:p>
             <a:fld id="{128153FC-B432-DA4A-81F6-1C862507BB60}" type="slidenum">
               <a:rPr lang="en-US" smtClean="0"/>
+              <a:pPr/>
               <a:t>‹#›</a:t>
             </a:fld>
             <a:endParaRPr lang="en-US"/>
@@ -453,7 +455,8 @@
           <a:p>
             <a:fld id="{00B26848-F507-264C-9913-CB59C8F3ADAB}" type="datetimeFigureOut">
               <a:rPr lang="en-US" smtClean="0"/>
-              <a:t>7/31/12</a:t>
+              <a:pPr/>
+              <a:t>8/1/12</a:t>
             </a:fld>
             <a:endParaRPr lang="en-US"/>
           </a:p>
@@ -495,6 +498,7 @@
           <a:p>
             <a:fld id="{128153FC-B432-DA4A-81F6-1C862507BB60}" type="slidenum">
               <a:rPr lang="en-US" smtClean="0"/>
+              <a:pPr/>
               <a:t>‹#›</a:t>
             </a:fld>
             <a:endParaRPr lang="en-US"/>
@@ -628,7 +632,8 @@
           <a:p>
             <a:fld id="{00B26848-F507-264C-9913-CB59C8F3ADAB}" type="datetimeFigureOut">
               <a:rPr lang="en-US" smtClean="0"/>
-              <a:t>7/31/12</a:t>
+              <a:pPr/>
+              <a:t>8/1/12</a:t>
             </a:fld>
             <a:endParaRPr lang="en-US"/>
           </a:p>
@@ -670,6 +675,7 @@
           <a:p>
             <a:fld id="{128153FC-B432-DA4A-81F6-1C862507BB60}" type="slidenum">
               <a:rPr lang="en-US" smtClean="0"/>
+              <a:pPr/>
               <a:t>‹#›</a:t>
             </a:fld>
             <a:endParaRPr lang="en-US"/>
@@ -793,7 +799,8 @@
           <a:p>
             <a:fld id="{00B26848-F507-264C-9913-CB59C8F3ADAB}" type="datetimeFigureOut">
               <a:rPr lang="en-US" smtClean="0"/>
-              <a:t>7/31/12</a:t>
+              <a:pPr/>
+              <a:t>8/1/12</a:t>
             </a:fld>
             <a:endParaRPr lang="en-US"/>
           </a:p>
@@ -835,6 +842,7 @@
           <a:p>
             <a:fld id="{128153FC-B432-DA4A-81F6-1C862507BB60}" type="slidenum">
               <a:rPr lang="en-US" smtClean="0"/>
+              <a:pPr/>
               <a:t>‹#›</a:t>
             </a:fld>
             <a:endParaRPr lang="en-US"/>
@@ -1034,7 +1042,8 @@
           <a:p>
             <a:fld id="{00B26848-F507-264C-9913-CB59C8F3ADAB}" type="datetimeFigureOut">
               <a:rPr lang="en-US" smtClean="0"/>
-              <a:t>7/31/12</a:t>
+              <a:pPr/>
+              <a:t>8/1/12</a:t>
             </a:fld>
             <a:endParaRPr lang="en-US"/>
           </a:p>
@@ -1076,6 +1085,7 @@
           <a:p>
             <a:fld id="{128153FC-B432-DA4A-81F6-1C862507BB60}" type="slidenum">
               <a:rPr lang="en-US" smtClean="0"/>
+              <a:pPr/>
               <a:t>‹#›</a:t>
             </a:fld>
             <a:endParaRPr lang="en-US"/>
@@ -1317,7 +1327,8 @@
           <a:p>
             <a:fld id="{00B26848-F507-264C-9913-CB59C8F3ADAB}" type="datetimeFigureOut">
               <a:rPr lang="en-US" smtClean="0"/>
-              <a:t>7/31/12</a:t>
+              <a:pPr/>
+              <a:t>8/1/12</a:t>
             </a:fld>
             <a:endParaRPr lang="en-US"/>
           </a:p>
@@ -1359,6 +1370,7 @@
           <a:p>
             <a:fld id="{128153FC-B432-DA4A-81F6-1C862507BB60}" type="slidenum">
               <a:rPr lang="en-US" smtClean="0"/>
+              <a:pPr/>
               <a:t>‹#›</a:t>
             </a:fld>
             <a:endParaRPr lang="en-US"/>
@@ -1734,7 +1746,8 @@
           <a:p>
             <a:fld id="{00B26848-F507-264C-9913-CB59C8F3ADAB}" type="datetimeFigureOut">
               <a:rPr lang="en-US" smtClean="0"/>
-              <a:t>7/31/12</a:t>
+              <a:pPr/>
+              <a:t>8/1/12</a:t>
             </a:fld>
             <a:endParaRPr lang="en-US"/>
           </a:p>
@@ -1776,6 +1789,7 @@
           <a:p>
             <a:fld id="{128153FC-B432-DA4A-81F6-1C862507BB60}" type="slidenum">
               <a:rPr lang="en-US" smtClean="0"/>
+              <a:pPr/>
               <a:t>‹#›</a:t>
             </a:fld>
             <a:endParaRPr lang="en-US"/>
@@ -1847,7 +1861,8 @@
           <a:p>
             <a:fld id="{00B26848-F507-264C-9913-CB59C8F3ADAB}" type="datetimeFigureOut">
               <a:rPr lang="en-US" smtClean="0"/>
-              <a:t>7/31/12</a:t>
+              <a:pPr/>
+              <a:t>8/1/12</a:t>
             </a:fld>
             <a:endParaRPr lang="en-US"/>
           </a:p>
@@ -1889,6 +1904,7 @@
           <a:p>
             <a:fld id="{128153FC-B432-DA4A-81F6-1C862507BB60}" type="slidenum">
               <a:rPr lang="en-US" smtClean="0"/>
+              <a:pPr/>
               <a:t>‹#›</a:t>
             </a:fld>
             <a:endParaRPr lang="en-US"/>
@@ -1937,7 +1953,8 @@
           <a:p>
             <a:fld id="{00B26848-F507-264C-9913-CB59C8F3ADAB}" type="datetimeFigureOut">
               <a:rPr lang="en-US" smtClean="0"/>
-              <a:t>7/31/12</a:t>
+              <a:pPr/>
+              <a:t>8/1/12</a:t>
             </a:fld>
             <a:endParaRPr lang="en-US"/>
           </a:p>
@@ -1979,6 +1996,7 @@
           <a:p>
             <a:fld id="{128153FC-B432-DA4A-81F6-1C862507BB60}" type="slidenum">
               <a:rPr lang="en-US" smtClean="0"/>
+              <a:pPr/>
               <a:t>‹#›</a:t>
             </a:fld>
             <a:endParaRPr lang="en-US"/>
@@ -2209,7 +2227,8 @@
           <a:p>
             <a:fld id="{00B26848-F507-264C-9913-CB59C8F3ADAB}" type="datetimeFigureOut">
               <a:rPr lang="en-US" smtClean="0"/>
-              <a:t>7/31/12</a:t>
+              <a:pPr/>
+              <a:t>8/1/12</a:t>
             </a:fld>
             <a:endParaRPr lang="en-US"/>
           </a:p>
@@ -2251,6 +2270,7 @@
           <a:p>
             <a:fld id="{128153FC-B432-DA4A-81F6-1C862507BB60}" type="slidenum">
               <a:rPr lang="en-US" smtClean="0"/>
+              <a:pPr/>
               <a:t>‹#›</a:t>
             </a:fld>
             <a:endParaRPr lang="en-US"/>
@@ -2457,7 +2477,8 @@
           <a:p>
             <a:fld id="{00B26848-F507-264C-9913-CB59C8F3ADAB}" type="datetimeFigureOut">
               <a:rPr lang="en-US" smtClean="0"/>
-              <a:t>7/31/12</a:t>
+              <a:pPr/>
+              <a:t>8/1/12</a:t>
             </a:fld>
             <a:endParaRPr lang="en-US"/>
           </a:p>
@@ -2499,6 +2520,7 @@
           <a:p>
             <a:fld id="{128153FC-B432-DA4A-81F6-1C862507BB60}" type="slidenum">
               <a:rPr lang="en-US" smtClean="0"/>
+              <a:pPr/>
               <a:t>‹#›</a:t>
             </a:fld>
             <a:endParaRPr lang="en-US"/>
@@ -2665,7 +2687,8 @@
           <a:p>
             <a:fld id="{00B26848-F507-264C-9913-CB59C8F3ADAB}" type="datetimeFigureOut">
               <a:rPr lang="en-US" smtClean="0"/>
-              <a:t>7/31/12</a:t>
+              <a:pPr/>
+              <a:t>8/1/12</a:t>
             </a:fld>
             <a:endParaRPr lang="en-US"/>
           </a:p>
@@ -2743,6 +2766,7 @@
           <a:p>
             <a:fld id="{128153FC-B432-DA4A-81F6-1C862507BB60}" type="slidenum">
               <a:rPr lang="en-US" smtClean="0"/>
+              <a:pPr/>
               <a:t>‹#›</a:t>
             </a:fld>
             <a:endParaRPr lang="en-US"/>
@@ -3089,7 +3113,7 @@
           <a:blip r:embed="rId2">
             <a:extLst>
               <a:ext uri="{28A0092B-C50C-407E-A947-70E740481C1C}">
-                <a14:useLocalDpi xmlns:a14="http://schemas.microsoft.com/office/drawing/2010/main" xmlns:p="http://schemas.openxmlformats.org/presentationml/2006/main" xmlns:r="http://schemas.openxmlformats.org/officeDocument/2006/relationships" xmlns:a="http://schemas.openxmlformats.org/drawingml/2006/main" xmlns="" val="0"/>
+                <a14:useLocalDpi xmlns="" xmlns:a="http://schemas.openxmlformats.org/drawingml/2006/main" xmlns:r="http://schemas.openxmlformats.org/officeDocument/2006/relationships" xmlns:p="http://schemas.openxmlformats.org/presentationml/2006/main" xmlns:a14="http://schemas.microsoft.com/office/drawing/2010/main" xmlns:mv="urn:schemas-microsoft-com:mac:vml" xmlns:mc="http://schemas.openxmlformats.org/markup-compatibility/2006" val="0"/>
               </a:ext>
             </a:extLst>
           </a:blip>

</xml_diff>